<commit_message>
Update Division Logic Architecture
</commit_message>
<xml_diff>
--- a/ComputerOrganization/Chapter3.pptx
+++ b/ComputerOrganization/Chapter3.pptx
@@ -8,6 +8,7 @@
     <p:sldId id="256" r:id="rId2"/>
     <p:sldId id="259" r:id="rId3"/>
     <p:sldId id="260" r:id="rId4"/>
+    <p:sldId id="261" r:id="rId5"/>
   </p:sldIdLst>
   <p:sldSz cx="12192000" cy="6858000"/>
   <p:notesSz cx="6858000" cy="9144000"/>
@@ -263,7 +264,7 @@
           <a:p>
             <a:fld id="{37A25B79-5AFE-40DE-8D90-7CD7EC558B08}" type="datetimeFigureOut">
               <a:rPr lang="ko-KR" altLang="en-US" smtClean="0"/>
-              <a:t>2019-07-04</a:t>
+              <a:t>2019-09-18</a:t>
             </a:fld>
             <a:endParaRPr lang="ko-KR" altLang="en-US"/>
           </a:p>
@@ -463,7 +464,7 @@
           <a:p>
             <a:fld id="{37A25B79-5AFE-40DE-8D90-7CD7EC558B08}" type="datetimeFigureOut">
               <a:rPr lang="ko-KR" altLang="en-US" smtClean="0"/>
-              <a:t>2019-07-04</a:t>
+              <a:t>2019-09-18</a:t>
             </a:fld>
             <a:endParaRPr lang="ko-KR" altLang="en-US"/>
           </a:p>
@@ -673,7 +674,7 @@
           <a:p>
             <a:fld id="{37A25B79-5AFE-40DE-8D90-7CD7EC558B08}" type="datetimeFigureOut">
               <a:rPr lang="ko-KR" altLang="en-US" smtClean="0"/>
-              <a:t>2019-07-04</a:t>
+              <a:t>2019-09-18</a:t>
             </a:fld>
             <a:endParaRPr lang="ko-KR" altLang="en-US"/>
           </a:p>
@@ -873,7 +874,7 @@
           <a:p>
             <a:fld id="{37A25B79-5AFE-40DE-8D90-7CD7EC558B08}" type="datetimeFigureOut">
               <a:rPr lang="ko-KR" altLang="en-US" smtClean="0"/>
-              <a:t>2019-07-04</a:t>
+              <a:t>2019-09-18</a:t>
             </a:fld>
             <a:endParaRPr lang="ko-KR" altLang="en-US"/>
           </a:p>
@@ -1149,7 +1150,7 @@
           <a:p>
             <a:fld id="{37A25B79-5AFE-40DE-8D90-7CD7EC558B08}" type="datetimeFigureOut">
               <a:rPr lang="ko-KR" altLang="en-US" smtClean="0"/>
-              <a:t>2019-07-04</a:t>
+              <a:t>2019-09-18</a:t>
             </a:fld>
             <a:endParaRPr lang="ko-KR" altLang="en-US"/>
           </a:p>
@@ -1417,7 +1418,7 @@
           <a:p>
             <a:fld id="{37A25B79-5AFE-40DE-8D90-7CD7EC558B08}" type="datetimeFigureOut">
               <a:rPr lang="ko-KR" altLang="en-US" smtClean="0"/>
-              <a:t>2019-07-04</a:t>
+              <a:t>2019-09-18</a:t>
             </a:fld>
             <a:endParaRPr lang="ko-KR" altLang="en-US"/>
           </a:p>
@@ -1832,7 +1833,7 @@
           <a:p>
             <a:fld id="{37A25B79-5AFE-40DE-8D90-7CD7EC558B08}" type="datetimeFigureOut">
               <a:rPr lang="ko-KR" altLang="en-US" smtClean="0"/>
-              <a:t>2019-07-04</a:t>
+              <a:t>2019-09-18</a:t>
             </a:fld>
             <a:endParaRPr lang="ko-KR" altLang="en-US"/>
           </a:p>
@@ -1974,7 +1975,7 @@
           <a:p>
             <a:fld id="{37A25B79-5AFE-40DE-8D90-7CD7EC558B08}" type="datetimeFigureOut">
               <a:rPr lang="ko-KR" altLang="en-US" smtClean="0"/>
-              <a:t>2019-07-04</a:t>
+              <a:t>2019-09-18</a:t>
             </a:fld>
             <a:endParaRPr lang="ko-KR" altLang="en-US"/>
           </a:p>
@@ -2087,7 +2088,7 @@
           <a:p>
             <a:fld id="{37A25B79-5AFE-40DE-8D90-7CD7EC558B08}" type="datetimeFigureOut">
               <a:rPr lang="ko-KR" altLang="en-US" smtClean="0"/>
-              <a:t>2019-07-04</a:t>
+              <a:t>2019-09-18</a:t>
             </a:fld>
             <a:endParaRPr lang="ko-KR" altLang="en-US"/>
           </a:p>
@@ -2400,7 +2401,7 @@
           <a:p>
             <a:fld id="{37A25B79-5AFE-40DE-8D90-7CD7EC558B08}" type="datetimeFigureOut">
               <a:rPr lang="ko-KR" altLang="en-US" smtClean="0"/>
-              <a:t>2019-07-04</a:t>
+              <a:t>2019-09-18</a:t>
             </a:fld>
             <a:endParaRPr lang="ko-KR" altLang="en-US"/>
           </a:p>
@@ -2689,7 +2690,7 @@
           <a:p>
             <a:fld id="{37A25B79-5AFE-40DE-8D90-7CD7EC558B08}" type="datetimeFigureOut">
               <a:rPr lang="ko-KR" altLang="en-US" smtClean="0"/>
-              <a:t>2019-07-04</a:t>
+              <a:t>2019-09-18</a:t>
             </a:fld>
             <a:endParaRPr lang="ko-KR" altLang="en-US"/>
           </a:p>
@@ -2932,7 +2933,7 @@
           <a:p>
             <a:fld id="{37A25B79-5AFE-40DE-8D90-7CD7EC558B08}" type="datetimeFigureOut">
               <a:rPr lang="ko-KR" altLang="en-US" smtClean="0"/>
-              <a:t>2019-07-04</a:t>
+              <a:t>2019-09-18</a:t>
             </a:fld>
             <a:endParaRPr lang="ko-KR" altLang="en-US"/>
           </a:p>
@@ -9864,6 +9865,1071 @@
                   <a:schemeClr val="tx1"/>
                 </a:solidFill>
                 <a:latin typeface="Noto Sans CJK KR Medium" panose="020B0600000000000000" pitchFamily="34" charset="-127"/>
+                <a:ea typeface="Noto Sans CJK KR Medium" panose="020B0600000000000000"/>
+              </a:rPr>
+              <a:t>64bits</a:t>
+            </a:r>
+            <a:endParaRPr lang="ko-KR" altLang="en-US" sz="1200" dirty="0">
+              <a:solidFill>
+                <a:schemeClr val="tx1"/>
+              </a:solidFill>
+              <a:ea typeface="Noto Sans CJK KR Medium" panose="020B0600000000000000"/>
+            </a:endParaRPr>
+          </a:p>
+        </p:txBody>
+      </p:sp>
+    </p:spTree>
+    <p:extLst>
+      <p:ext uri="{BB962C8B-B14F-4D97-AF65-F5344CB8AC3E}">
+        <p14:creationId xmlns:p14="http://schemas.microsoft.com/office/powerpoint/2010/main" val="1681449303"/>
+      </p:ext>
+    </p:extLst>
+  </p:cSld>
+  <p:clrMapOvr>
+    <a:masterClrMapping/>
+  </p:clrMapOvr>
+</p:sld>
+</file>
+
+<file path=ppt/slides/slide4.xml><?xml version="1.0" encoding="utf-8"?>
+<p:sld xmlns:a="http://schemas.openxmlformats.org/drawingml/2006/main" xmlns:r="http://schemas.openxmlformats.org/officeDocument/2006/relationships" xmlns:p="http://schemas.openxmlformats.org/presentationml/2006/main">
+  <p:cSld>
+    <p:spTree>
+      <p:nvGrpSpPr>
+        <p:cNvPr id="1" name=""/>
+        <p:cNvGrpSpPr/>
+        <p:nvPr/>
+      </p:nvGrpSpPr>
+      <p:grpSpPr>
+        <a:xfrm>
+          <a:off x="0" y="0"/>
+          <a:ext cx="0" cy="0"/>
+          <a:chOff x="0" y="0"/>
+          <a:chExt cx="0" cy="0"/>
+        </a:xfrm>
+      </p:grpSpPr>
+      <p:sp>
+        <p:nvSpPr>
+          <p:cNvPr id="37" name="Rectangle 36">
+            <a:extLst>
+              <a:ext uri="{FF2B5EF4-FFF2-40B4-BE49-F238E27FC236}">
+                <a16:creationId xmlns:a16="http://schemas.microsoft.com/office/drawing/2014/main" id="{63B9E2CB-35CB-4F5E-BF83-B7E79B238D81}"/>
+              </a:ext>
+            </a:extLst>
+          </p:cNvPr>
+          <p:cNvSpPr/>
+          <p:nvPr/>
+        </p:nvSpPr>
+        <p:spPr>
+          <a:xfrm>
+            <a:off x="3048972" y="5014617"/>
+            <a:ext cx="2179976" cy="843886"/>
+          </a:xfrm>
+          <a:prstGeom prst="rect">
+            <a:avLst/>
+          </a:prstGeom>
+          <a:solidFill>
+            <a:srgbClr val="787878"/>
+          </a:solidFill>
+          <a:ln>
+            <a:noFill/>
+          </a:ln>
+        </p:spPr>
+        <p:style>
+          <a:lnRef idx="2">
+            <a:schemeClr val="accent1">
+              <a:shade val="50000"/>
+            </a:schemeClr>
+          </a:lnRef>
+          <a:fillRef idx="1">
+            <a:schemeClr val="accent1"/>
+          </a:fillRef>
+          <a:effectRef idx="0">
+            <a:schemeClr val="accent1"/>
+          </a:effectRef>
+          <a:fontRef idx="minor">
+            <a:schemeClr val="lt1"/>
+          </a:fontRef>
+        </p:style>
+        <p:txBody>
+          <a:bodyPr rtlCol="0" anchor="ctr"/>
+          <a:lstStyle/>
+          <a:p>
+            <a:pPr algn="ctr"/>
+            <a:endParaRPr lang="ko-KR" altLang="en-US" dirty="0"/>
+          </a:p>
+        </p:txBody>
+      </p:sp>
+      <p:sp>
+        <p:nvSpPr>
+          <p:cNvPr id="6" name="Rectangle 5">
+            <a:extLst>
+              <a:ext uri="{FF2B5EF4-FFF2-40B4-BE49-F238E27FC236}">
+                <a16:creationId xmlns:a16="http://schemas.microsoft.com/office/drawing/2014/main" id="{386837E1-34D3-48A7-8764-FF3A069C77A0}"/>
+              </a:ext>
+            </a:extLst>
+          </p:cNvPr>
+          <p:cNvSpPr/>
+          <p:nvPr/>
+        </p:nvSpPr>
+        <p:spPr>
+          <a:xfrm>
+            <a:off x="1" y="0"/>
+            <a:ext cx="1822612" cy="6858000"/>
+          </a:xfrm>
+          <a:prstGeom prst="rect">
+            <a:avLst/>
+          </a:prstGeom>
+          <a:solidFill>
+            <a:srgbClr val="013B51"/>
+          </a:solidFill>
+          <a:ln>
+            <a:noFill/>
+          </a:ln>
+        </p:spPr>
+        <p:style>
+          <a:lnRef idx="2">
+            <a:schemeClr val="accent1">
+              <a:shade val="50000"/>
+            </a:schemeClr>
+          </a:lnRef>
+          <a:fillRef idx="1">
+            <a:schemeClr val="accent1"/>
+          </a:fillRef>
+          <a:effectRef idx="0">
+            <a:schemeClr val="accent1"/>
+          </a:effectRef>
+          <a:fontRef idx="minor">
+            <a:schemeClr val="lt1"/>
+          </a:fontRef>
+        </p:style>
+        <p:txBody>
+          <a:bodyPr rtlCol="0" anchor="ctr"/>
+          <a:lstStyle/>
+          <a:p>
+            <a:pPr algn="ctr"/>
+            <a:endParaRPr lang="ko-KR" altLang="en-US"/>
+          </a:p>
+        </p:txBody>
+      </p:sp>
+      <p:grpSp>
+        <p:nvGrpSpPr>
+          <p:cNvPr id="4" name="Group 3">
+            <a:extLst>
+              <a:ext uri="{FF2B5EF4-FFF2-40B4-BE49-F238E27FC236}">
+                <a16:creationId xmlns:a16="http://schemas.microsoft.com/office/drawing/2014/main" id="{7072584C-6260-4990-8119-F48D43DF9D1D}"/>
+              </a:ext>
+            </a:extLst>
+          </p:cNvPr>
+          <p:cNvGrpSpPr/>
+          <p:nvPr/>
+        </p:nvGrpSpPr>
+        <p:grpSpPr>
+          <a:xfrm>
+            <a:off x="227192" y="110970"/>
+            <a:ext cx="7619352" cy="6027939"/>
+            <a:chOff x="2068497" y="372861"/>
+            <a:chExt cx="7619352" cy="6027939"/>
+          </a:xfrm>
+        </p:grpSpPr>
+        <p:grpSp>
+          <p:nvGrpSpPr>
+            <p:cNvPr id="16" name="Group 15">
+              <a:extLst>
+                <a:ext uri="{FF2B5EF4-FFF2-40B4-BE49-F238E27FC236}">
+                  <a16:creationId xmlns:a16="http://schemas.microsoft.com/office/drawing/2014/main" id="{9FED8531-C6D3-4649-A895-F74932994A64}"/>
+                </a:ext>
+              </a:extLst>
+            </p:cNvPr>
+            <p:cNvGrpSpPr/>
+            <p:nvPr/>
+          </p:nvGrpSpPr>
+          <p:grpSpPr>
+            <a:xfrm>
+              <a:off x="2183906" y="372861"/>
+              <a:ext cx="7503943" cy="5797120"/>
+              <a:chOff x="2183906" y="372861"/>
+              <a:chExt cx="7503943" cy="5797120"/>
+            </a:xfrm>
+          </p:grpSpPr>
+          <p:cxnSp>
+            <p:nvCxnSpPr>
+              <p:cNvPr id="11" name="Straight Connector 10">
+                <a:extLst>
+                  <a:ext uri="{FF2B5EF4-FFF2-40B4-BE49-F238E27FC236}">
+                    <a16:creationId xmlns:a16="http://schemas.microsoft.com/office/drawing/2014/main" id="{0FA2315E-967B-45B9-A0F4-B526CF82C921}"/>
+                  </a:ext>
+                </a:extLst>
+              </p:cNvPr>
+              <p:cNvCxnSpPr>
+                <a:stCxn id="9" idx="0"/>
+              </p:cNvCxnSpPr>
+              <p:nvPr/>
+            </p:nvCxnSpPr>
+            <p:spPr>
+              <a:xfrm flipV="1">
+                <a:off x="2183907" y="457200"/>
+                <a:ext cx="0" cy="5712781"/>
+              </a:xfrm>
+              <a:prstGeom prst="line">
+                <a:avLst/>
+              </a:prstGeom>
+              <a:ln w="57150">
+                <a:solidFill>
+                  <a:srgbClr val="DABA6F"/>
+                </a:solidFill>
+              </a:ln>
+            </p:spPr>
+            <p:style>
+              <a:lnRef idx="1">
+                <a:schemeClr val="accent1"/>
+              </a:lnRef>
+              <a:fillRef idx="0">
+                <a:schemeClr val="accent1"/>
+              </a:fillRef>
+              <a:effectRef idx="0">
+                <a:schemeClr val="accent1"/>
+              </a:effectRef>
+              <a:fontRef idx="minor">
+                <a:schemeClr val="tx1"/>
+              </a:fontRef>
+            </p:style>
+          </p:cxnSp>
+          <p:cxnSp>
+            <p:nvCxnSpPr>
+              <p:cNvPr id="12" name="Straight Connector 11">
+                <a:extLst>
+                  <a:ext uri="{FF2B5EF4-FFF2-40B4-BE49-F238E27FC236}">
+                    <a16:creationId xmlns:a16="http://schemas.microsoft.com/office/drawing/2014/main" id="{92518781-1781-40F6-9291-FD4D938DE48A}"/>
+                  </a:ext>
+                </a:extLst>
+              </p:cNvPr>
+              <p:cNvCxnSpPr>
+                <a:cxnSpLocks/>
+              </p:cNvCxnSpPr>
+              <p:nvPr/>
+            </p:nvCxnSpPr>
+            <p:spPr>
+              <a:xfrm flipH="1">
+                <a:off x="2183906" y="488271"/>
+                <a:ext cx="7273124" cy="1"/>
+              </a:xfrm>
+              <a:prstGeom prst="line">
+                <a:avLst/>
+              </a:prstGeom>
+              <a:ln w="57150">
+                <a:solidFill>
+                  <a:srgbClr val="DABA6F"/>
+                </a:solidFill>
+              </a:ln>
+            </p:spPr>
+            <p:style>
+              <a:lnRef idx="1">
+                <a:schemeClr val="accent1"/>
+              </a:lnRef>
+              <a:fillRef idx="0">
+                <a:schemeClr val="accent1"/>
+              </a:fillRef>
+              <a:effectRef idx="0">
+                <a:schemeClr val="accent1"/>
+              </a:effectRef>
+              <a:fontRef idx="minor">
+                <a:schemeClr val="tx1"/>
+              </a:fontRef>
+            </p:style>
+          </p:cxnSp>
+          <p:sp>
+            <p:nvSpPr>
+              <p:cNvPr id="15" name="Rectangle 14">
+                <a:extLst>
+                  <a:ext uri="{FF2B5EF4-FFF2-40B4-BE49-F238E27FC236}">
+                    <a16:creationId xmlns:a16="http://schemas.microsoft.com/office/drawing/2014/main" id="{57D81539-1F79-4E3F-B190-8AEB88C54CD2}"/>
+                  </a:ext>
+                </a:extLst>
+              </p:cNvPr>
+              <p:cNvSpPr/>
+              <p:nvPr/>
+            </p:nvSpPr>
+            <p:spPr>
+              <a:xfrm>
+                <a:off x="9457030" y="372861"/>
+                <a:ext cx="230819" cy="230819"/>
+              </a:xfrm>
+              <a:prstGeom prst="rect">
+                <a:avLst/>
+              </a:prstGeom>
+              <a:solidFill>
+                <a:srgbClr val="DABA6F"/>
+              </a:solidFill>
+              <a:ln>
+                <a:noFill/>
+              </a:ln>
+            </p:spPr>
+            <p:style>
+              <a:lnRef idx="2">
+                <a:schemeClr val="accent1">
+                  <a:shade val="50000"/>
+                </a:schemeClr>
+              </a:lnRef>
+              <a:fillRef idx="1">
+                <a:schemeClr val="accent1"/>
+              </a:fillRef>
+              <a:effectRef idx="0">
+                <a:schemeClr val="accent1"/>
+              </a:effectRef>
+              <a:fontRef idx="minor">
+                <a:schemeClr val="lt1"/>
+              </a:fontRef>
+            </p:style>
+            <p:txBody>
+              <a:bodyPr rtlCol="0" anchor="ctr"/>
+              <a:lstStyle/>
+              <a:p>
+                <a:pPr algn="ctr"/>
+                <a:endParaRPr lang="ko-KR" altLang="en-US"/>
+              </a:p>
+            </p:txBody>
+          </p:sp>
+        </p:grpSp>
+        <p:sp>
+          <p:nvSpPr>
+            <p:cNvPr id="9" name="Rectangle 8">
+              <a:extLst>
+                <a:ext uri="{FF2B5EF4-FFF2-40B4-BE49-F238E27FC236}">
+                  <a16:creationId xmlns:a16="http://schemas.microsoft.com/office/drawing/2014/main" id="{CD2CA69E-F38E-4DB8-82FA-239D6C25BC80}"/>
+                </a:ext>
+              </a:extLst>
+            </p:cNvPr>
+            <p:cNvSpPr/>
+            <p:nvPr/>
+          </p:nvSpPr>
+          <p:spPr>
+            <a:xfrm>
+              <a:off x="2068497" y="6169981"/>
+              <a:ext cx="230819" cy="230819"/>
+            </a:xfrm>
+            <a:prstGeom prst="rect">
+              <a:avLst/>
+            </a:prstGeom>
+            <a:solidFill>
+              <a:srgbClr val="DABA6F"/>
+            </a:solidFill>
+            <a:ln>
+              <a:noFill/>
+            </a:ln>
+          </p:spPr>
+          <p:style>
+            <a:lnRef idx="2">
+              <a:schemeClr val="accent1">
+                <a:shade val="50000"/>
+              </a:schemeClr>
+            </a:lnRef>
+            <a:fillRef idx="1">
+              <a:schemeClr val="accent1"/>
+            </a:fillRef>
+            <a:effectRef idx="0">
+              <a:schemeClr val="accent1"/>
+            </a:effectRef>
+            <a:fontRef idx="minor">
+              <a:schemeClr val="lt1"/>
+            </a:fontRef>
+          </p:style>
+          <p:txBody>
+            <a:bodyPr rtlCol="0" anchor="ctr"/>
+            <a:lstStyle/>
+            <a:p>
+              <a:pPr algn="ctr"/>
+              <a:endParaRPr lang="ko-KR" altLang="en-US" dirty="0"/>
+            </a:p>
+          </p:txBody>
+        </p:sp>
+      </p:grpSp>
+      <p:sp>
+        <p:nvSpPr>
+          <p:cNvPr id="7" name="Rectangle 6">
+            <a:extLst>
+              <a:ext uri="{FF2B5EF4-FFF2-40B4-BE49-F238E27FC236}">
+                <a16:creationId xmlns:a16="http://schemas.microsoft.com/office/drawing/2014/main" id="{2C38F449-7454-4AD1-AE1F-DA48EBB24C9F}"/>
+              </a:ext>
+            </a:extLst>
+          </p:cNvPr>
+          <p:cNvSpPr/>
+          <p:nvPr/>
+        </p:nvSpPr>
+        <p:spPr>
+          <a:xfrm>
+            <a:off x="1" y="463891"/>
+            <a:ext cx="12192000" cy="1091263"/>
+          </a:xfrm>
+          <a:prstGeom prst="rect">
+            <a:avLst/>
+          </a:prstGeom>
+          <a:solidFill>
+            <a:srgbClr val="0182C6"/>
+          </a:solidFill>
+          <a:ln>
+            <a:noFill/>
+          </a:ln>
+        </p:spPr>
+        <p:style>
+          <a:lnRef idx="2">
+            <a:schemeClr val="accent1">
+              <a:shade val="50000"/>
+            </a:schemeClr>
+          </a:lnRef>
+          <a:fillRef idx="1">
+            <a:schemeClr val="accent1"/>
+          </a:fillRef>
+          <a:effectRef idx="0">
+            <a:schemeClr val="accent1"/>
+          </a:effectRef>
+          <a:fontRef idx="minor">
+            <a:schemeClr val="lt1"/>
+          </a:fontRef>
+        </p:style>
+        <p:txBody>
+          <a:bodyPr rtlCol="0" anchor="ctr"/>
+          <a:lstStyle/>
+          <a:p>
+            <a:pPr algn="ctr"/>
+            <a:endParaRPr lang="ko-KR" altLang="en-US"/>
+          </a:p>
+        </p:txBody>
+      </p:sp>
+      <p:sp>
+        <p:nvSpPr>
+          <p:cNvPr id="2" name="Title 1">
+            <a:extLst>
+              <a:ext uri="{FF2B5EF4-FFF2-40B4-BE49-F238E27FC236}">
+                <a16:creationId xmlns:a16="http://schemas.microsoft.com/office/drawing/2014/main" id="{9DBFE3BC-27EC-435A-A2F4-B39DEF708845}"/>
+              </a:ext>
+            </a:extLst>
+          </p:cNvPr>
+          <p:cNvSpPr>
+            <a:spLocks noGrp="1"/>
+          </p:cNvSpPr>
+          <p:nvPr>
+            <p:ph type="ctrTitle"/>
+          </p:nvPr>
+        </p:nvSpPr>
+        <p:spPr>
+          <a:xfrm>
+            <a:off x="88777" y="606013"/>
+            <a:ext cx="12014446" cy="746289"/>
+          </a:xfrm>
+        </p:spPr>
+        <p:txBody>
+          <a:bodyPr>
+            <a:normAutofit/>
+          </a:bodyPr>
+          <a:lstStyle/>
+          <a:p>
+            <a:r>
+              <a:rPr lang="en-US" altLang="ko-KR" sz="4000" dirty="0">
+                <a:solidFill>
+                  <a:srgbClr val="EBFFFF"/>
+                </a:solidFill>
+                <a:latin typeface="Noto Sans CJK KR Medium" panose="020B0600000000000000" pitchFamily="34" charset="-127"/>
+                <a:ea typeface="Noto Sans CJK KR Medium" panose="020B0600000000000000" pitchFamily="34" charset="-127"/>
+              </a:rPr>
+              <a:t>Division</a:t>
+            </a:r>
+            <a:endParaRPr lang="ko-KR" altLang="en-US" sz="4000" dirty="0">
+              <a:solidFill>
+                <a:srgbClr val="EBFFFF"/>
+              </a:solidFill>
+              <a:latin typeface="Noto Sans CJK KR Medium" panose="020B0600000000000000" pitchFamily="34" charset="-127"/>
+              <a:ea typeface="Noto Sans CJK KR Medium" panose="020B0600000000000000" pitchFamily="34" charset="-127"/>
+            </a:endParaRPr>
+          </a:p>
+        </p:txBody>
+      </p:sp>
+      <p:sp>
+        <p:nvSpPr>
+          <p:cNvPr id="24" name="Freeform: Shape 23">
+            <a:extLst>
+              <a:ext uri="{FF2B5EF4-FFF2-40B4-BE49-F238E27FC236}">
+                <a16:creationId xmlns:a16="http://schemas.microsoft.com/office/drawing/2014/main" id="{2DC975FD-6B95-4187-8A63-7A7C53EE9C62}"/>
+              </a:ext>
+            </a:extLst>
+          </p:cNvPr>
+          <p:cNvSpPr/>
+          <p:nvPr/>
+        </p:nvSpPr>
+        <p:spPr>
+          <a:xfrm rot="10800000">
+            <a:off x="3180173" y="3524293"/>
+            <a:ext cx="1953087" cy="985422"/>
+          </a:xfrm>
+          <a:custGeom>
+            <a:avLst/>
+            <a:gdLst>
+              <a:gd name="connsiteX0" fmla="*/ 468302 w 1953087"/>
+              <a:gd name="connsiteY0" fmla="*/ 0 h 985422"/>
+              <a:gd name="connsiteX1" fmla="*/ 1484785 w 1953087"/>
+              <a:gd name="connsiteY1" fmla="*/ 0 h 985422"/>
+              <a:gd name="connsiteX2" fmla="*/ 1953087 w 1953087"/>
+              <a:gd name="connsiteY2" fmla="*/ 985422 h 985422"/>
+              <a:gd name="connsiteX3" fmla="*/ 1428729 w 1953087"/>
+              <a:gd name="connsiteY3" fmla="*/ 985422 h 985422"/>
+              <a:gd name="connsiteX4" fmla="*/ 1286109 w 1953087"/>
+              <a:gd name="connsiteY4" fmla="*/ 685316 h 985422"/>
+              <a:gd name="connsiteX5" fmla="*/ 666979 w 1953087"/>
+              <a:gd name="connsiteY5" fmla="*/ 685316 h 985422"/>
+              <a:gd name="connsiteX6" fmla="*/ 524360 w 1953087"/>
+              <a:gd name="connsiteY6" fmla="*/ 985422 h 985422"/>
+              <a:gd name="connsiteX7" fmla="*/ 0 w 1953087"/>
+              <a:gd name="connsiteY7" fmla="*/ 985422 h 985422"/>
+            </a:gdLst>
+            <a:ahLst/>
+            <a:cxnLst>
+              <a:cxn ang="0">
+                <a:pos x="connsiteX0" y="connsiteY0"/>
+              </a:cxn>
+              <a:cxn ang="0">
+                <a:pos x="connsiteX1" y="connsiteY1"/>
+              </a:cxn>
+              <a:cxn ang="0">
+                <a:pos x="connsiteX2" y="connsiteY2"/>
+              </a:cxn>
+              <a:cxn ang="0">
+                <a:pos x="connsiteX3" y="connsiteY3"/>
+              </a:cxn>
+              <a:cxn ang="0">
+                <a:pos x="connsiteX4" y="connsiteY4"/>
+              </a:cxn>
+              <a:cxn ang="0">
+                <a:pos x="connsiteX5" y="connsiteY5"/>
+              </a:cxn>
+              <a:cxn ang="0">
+                <a:pos x="connsiteX6" y="connsiteY6"/>
+              </a:cxn>
+              <a:cxn ang="0">
+                <a:pos x="connsiteX7" y="connsiteY7"/>
+              </a:cxn>
+            </a:cxnLst>
+            <a:rect l="l" t="t" r="r" b="b"/>
+            <a:pathLst>
+              <a:path w="1953087" h="985422">
+                <a:moveTo>
+                  <a:pt x="468302" y="0"/>
+                </a:moveTo>
+                <a:lnTo>
+                  <a:pt x="1484785" y="0"/>
+                </a:lnTo>
+                <a:lnTo>
+                  <a:pt x="1953087" y="985422"/>
+                </a:lnTo>
+                <a:lnTo>
+                  <a:pt x="1428729" y="985422"/>
+                </a:lnTo>
+                <a:lnTo>
+                  <a:pt x="1286109" y="685316"/>
+                </a:lnTo>
+                <a:lnTo>
+                  <a:pt x="666979" y="685316"/>
+                </a:lnTo>
+                <a:lnTo>
+                  <a:pt x="524360" y="985422"/>
+                </a:lnTo>
+                <a:lnTo>
+                  <a:pt x="0" y="985422"/>
+                </a:lnTo>
+                <a:close/>
+              </a:path>
+            </a:pathLst>
+          </a:custGeom>
+          <a:solidFill>
+            <a:srgbClr val="013B51"/>
+          </a:solidFill>
+          <a:ln>
+            <a:noFill/>
+          </a:ln>
+        </p:spPr>
+        <p:style>
+          <a:lnRef idx="2">
+            <a:schemeClr val="accent1">
+              <a:shade val="50000"/>
+            </a:schemeClr>
+          </a:lnRef>
+          <a:fillRef idx="1">
+            <a:schemeClr val="accent1"/>
+          </a:fillRef>
+          <a:effectRef idx="0">
+            <a:schemeClr val="accent1"/>
+          </a:effectRef>
+          <a:fontRef idx="minor">
+            <a:schemeClr val="lt1"/>
+          </a:fontRef>
+        </p:style>
+        <p:txBody>
+          <a:bodyPr rtlCol="0" anchor="ctr"/>
+          <a:lstStyle/>
+          <a:p>
+            <a:pPr algn="ctr"/>
+            <a:endParaRPr lang="ko-KR" altLang="en-US" dirty="0"/>
+          </a:p>
+        </p:txBody>
+      </p:sp>
+      <p:cxnSp>
+        <p:nvCxnSpPr>
+          <p:cNvPr id="25" name="Straight Arrow Connector 24">
+            <a:extLst>
+              <a:ext uri="{FF2B5EF4-FFF2-40B4-BE49-F238E27FC236}">
+                <a16:creationId xmlns:a16="http://schemas.microsoft.com/office/drawing/2014/main" id="{C5BF7887-2CE3-41D7-AB1B-3ACDDC784917}"/>
+              </a:ext>
+            </a:extLst>
+          </p:cNvPr>
+          <p:cNvCxnSpPr>
+            <a:cxnSpLocks/>
+          </p:cNvCxnSpPr>
+          <p:nvPr/>
+        </p:nvCxnSpPr>
+        <p:spPr>
+          <a:xfrm>
+            <a:off x="3453414" y="3053918"/>
+            <a:ext cx="0" cy="468156"/>
+          </a:xfrm>
+          <a:prstGeom prst="straightConnector1">
+            <a:avLst/>
+          </a:prstGeom>
+          <a:ln w="38100">
+            <a:solidFill>
+              <a:srgbClr val="013B51"/>
+            </a:solidFill>
+            <a:tailEnd type="triangle"/>
+          </a:ln>
+        </p:spPr>
+        <p:style>
+          <a:lnRef idx="1">
+            <a:schemeClr val="accent1"/>
+          </a:lnRef>
+          <a:fillRef idx="0">
+            <a:schemeClr val="accent1"/>
+          </a:fillRef>
+          <a:effectRef idx="0">
+            <a:schemeClr val="accent1"/>
+          </a:effectRef>
+          <a:fontRef idx="minor">
+            <a:schemeClr val="tx1"/>
+          </a:fontRef>
+        </p:style>
+      </p:cxnSp>
+      <p:cxnSp>
+        <p:nvCxnSpPr>
+          <p:cNvPr id="26" name="Straight Arrow Connector 25">
+            <a:extLst>
+              <a:ext uri="{FF2B5EF4-FFF2-40B4-BE49-F238E27FC236}">
+                <a16:creationId xmlns:a16="http://schemas.microsoft.com/office/drawing/2014/main" id="{993D9254-DB49-4E4A-8D64-BEE6D649C305}"/>
+              </a:ext>
+            </a:extLst>
+          </p:cNvPr>
+          <p:cNvCxnSpPr>
+            <a:cxnSpLocks/>
+          </p:cNvCxnSpPr>
+          <p:nvPr/>
+        </p:nvCxnSpPr>
+        <p:spPr>
+          <a:xfrm>
+            <a:off x="4873841" y="2989121"/>
+            <a:ext cx="0" cy="532953"/>
+          </a:xfrm>
+          <a:prstGeom prst="straightConnector1">
+            <a:avLst/>
+          </a:prstGeom>
+          <a:ln w="38100">
+            <a:solidFill>
+              <a:srgbClr val="013B51"/>
+            </a:solidFill>
+            <a:tailEnd type="triangle"/>
+          </a:ln>
+        </p:spPr>
+        <p:style>
+          <a:lnRef idx="1">
+            <a:schemeClr val="accent1"/>
+          </a:lnRef>
+          <a:fillRef idx="0">
+            <a:schemeClr val="accent1"/>
+          </a:fillRef>
+          <a:effectRef idx="0">
+            <a:schemeClr val="accent1"/>
+          </a:effectRef>
+          <a:fontRef idx="minor">
+            <a:schemeClr val="tx1"/>
+          </a:fontRef>
+        </p:style>
+      </p:cxnSp>
+      <p:cxnSp>
+        <p:nvCxnSpPr>
+          <p:cNvPr id="27" name="Straight Arrow Connector 26">
+            <a:extLst>
+              <a:ext uri="{FF2B5EF4-FFF2-40B4-BE49-F238E27FC236}">
+                <a16:creationId xmlns:a16="http://schemas.microsoft.com/office/drawing/2014/main" id="{7691019B-BA27-4619-B38D-A5558DC4FB87}"/>
+              </a:ext>
+            </a:extLst>
+          </p:cNvPr>
+          <p:cNvCxnSpPr>
+            <a:cxnSpLocks/>
+          </p:cNvCxnSpPr>
+          <p:nvPr/>
+        </p:nvCxnSpPr>
+        <p:spPr>
+          <a:xfrm>
+            <a:off x="4138960" y="4509716"/>
+            <a:ext cx="0" cy="509340"/>
+          </a:xfrm>
+          <a:prstGeom prst="straightConnector1">
+            <a:avLst/>
+          </a:prstGeom>
+          <a:ln w="38100">
+            <a:solidFill>
+              <a:srgbClr val="013B51"/>
+            </a:solidFill>
+            <a:tailEnd type="triangle"/>
+          </a:ln>
+        </p:spPr>
+        <p:style>
+          <a:lnRef idx="1">
+            <a:schemeClr val="accent1"/>
+          </a:lnRef>
+          <a:fillRef idx="0">
+            <a:schemeClr val="accent1"/>
+          </a:fillRef>
+          <a:effectRef idx="0">
+            <a:schemeClr val="accent1"/>
+          </a:effectRef>
+          <a:fontRef idx="minor">
+            <a:schemeClr val="tx1"/>
+          </a:fontRef>
+        </p:style>
+      </p:cxnSp>
+      <p:cxnSp>
+        <p:nvCxnSpPr>
+          <p:cNvPr id="28" name="Straight Arrow Connector 27">
+            <a:extLst>
+              <a:ext uri="{FF2B5EF4-FFF2-40B4-BE49-F238E27FC236}">
+                <a16:creationId xmlns:a16="http://schemas.microsoft.com/office/drawing/2014/main" id="{F68C90F7-F8E6-4429-AB43-085BD460204A}"/>
+              </a:ext>
+            </a:extLst>
+          </p:cNvPr>
+          <p:cNvCxnSpPr>
+            <a:cxnSpLocks/>
+          </p:cNvCxnSpPr>
+          <p:nvPr/>
+        </p:nvCxnSpPr>
+        <p:spPr>
+          <a:xfrm flipH="1">
+            <a:off x="4873841" y="4017004"/>
+            <a:ext cx="1713390" cy="0"/>
+          </a:xfrm>
+          <a:prstGeom prst="straightConnector1">
+            <a:avLst/>
+          </a:prstGeom>
+          <a:ln w="38100">
+            <a:solidFill>
+              <a:srgbClr val="013B51"/>
+            </a:solidFill>
+            <a:tailEnd type="triangle"/>
+          </a:ln>
+        </p:spPr>
+        <p:style>
+          <a:lnRef idx="1">
+            <a:schemeClr val="accent1"/>
+          </a:lnRef>
+          <a:fillRef idx="0">
+            <a:schemeClr val="accent1"/>
+          </a:fillRef>
+          <a:effectRef idx="0">
+            <a:schemeClr val="accent1"/>
+          </a:effectRef>
+          <a:fontRef idx="minor">
+            <a:schemeClr val="tx1"/>
+          </a:fontRef>
+        </p:style>
+      </p:cxnSp>
+      <p:cxnSp>
+        <p:nvCxnSpPr>
+          <p:cNvPr id="30" name="Straight Arrow Connector 29">
+            <a:extLst>
+              <a:ext uri="{FF2B5EF4-FFF2-40B4-BE49-F238E27FC236}">
+                <a16:creationId xmlns:a16="http://schemas.microsoft.com/office/drawing/2014/main" id="{0D11591A-D11C-4470-86CF-8ED8D5ED27F4}"/>
+              </a:ext>
+            </a:extLst>
+          </p:cNvPr>
+          <p:cNvCxnSpPr>
+            <a:cxnSpLocks/>
+          </p:cNvCxnSpPr>
+          <p:nvPr/>
+        </p:nvCxnSpPr>
+        <p:spPr>
+          <a:xfrm flipH="1">
+            <a:off x="7843439" y="5465292"/>
+            <a:ext cx="906622" cy="0"/>
+          </a:xfrm>
+          <a:prstGeom prst="straightConnector1">
+            <a:avLst/>
+          </a:prstGeom>
+          <a:ln w="38100">
+            <a:solidFill>
+              <a:srgbClr val="013B51"/>
+            </a:solidFill>
+            <a:tailEnd type="triangle"/>
+          </a:ln>
+        </p:spPr>
+        <p:style>
+          <a:lnRef idx="1">
+            <a:schemeClr val="accent1"/>
+          </a:lnRef>
+          <a:fillRef idx="0">
+            <a:schemeClr val="accent1"/>
+          </a:fillRef>
+          <a:effectRef idx="0">
+            <a:schemeClr val="accent1"/>
+          </a:effectRef>
+          <a:fontRef idx="minor">
+            <a:schemeClr val="tx1"/>
+          </a:fontRef>
+        </p:style>
+      </p:cxnSp>
+      <p:sp>
+        <p:nvSpPr>
+          <p:cNvPr id="32" name="Rectangle 31">
+            <a:extLst>
+              <a:ext uri="{FF2B5EF4-FFF2-40B4-BE49-F238E27FC236}">
+                <a16:creationId xmlns:a16="http://schemas.microsoft.com/office/drawing/2014/main" id="{6AB8FF40-EAA9-4E0E-B9F2-0A2E7A2754DA}"/>
+              </a:ext>
+            </a:extLst>
+          </p:cNvPr>
+          <p:cNvSpPr/>
+          <p:nvPr/>
+        </p:nvSpPr>
+        <p:spPr>
+          <a:xfrm>
+            <a:off x="3512504" y="3662693"/>
+            <a:ext cx="1277036" cy="914372"/>
+          </a:xfrm>
+          <a:prstGeom prst="rect">
+            <a:avLst/>
+          </a:prstGeom>
+          <a:noFill/>
+          <a:ln>
+            <a:noFill/>
+          </a:ln>
+        </p:spPr>
+        <p:style>
+          <a:lnRef idx="2">
+            <a:schemeClr val="accent1">
+              <a:shade val="50000"/>
+            </a:schemeClr>
+          </a:lnRef>
+          <a:fillRef idx="1">
+            <a:schemeClr val="accent1"/>
+          </a:fillRef>
+          <a:effectRef idx="0">
+            <a:schemeClr val="accent1"/>
+          </a:effectRef>
+          <a:fontRef idx="minor">
+            <a:schemeClr val="lt1"/>
+          </a:fontRef>
+        </p:style>
+        <p:txBody>
+          <a:bodyPr rtlCol="0" anchor="ctr"/>
+          <a:lstStyle/>
+          <a:p>
+            <a:pPr algn="ctr"/>
+            <a:r>
+              <a:rPr lang="en-US" altLang="ko-KR" sz="1600" dirty="0">
+                <a:solidFill>
+                  <a:srgbClr val="EBFFFF"/>
+                </a:solidFill>
+                <a:latin typeface="Noto Sans CJK KR Medium" panose="020B0600000000000000" pitchFamily="34" charset="-127"/>
+                <a:ea typeface="Noto Sans CJK KR Medium" panose="020B0600000000000000" pitchFamily="34" charset="-127"/>
+              </a:rPr>
+              <a:t>64-bit ALU</a:t>
+            </a:r>
+            <a:endParaRPr lang="ko-KR" altLang="en-US" sz="1600" dirty="0"/>
+          </a:p>
+        </p:txBody>
+      </p:sp>
+      <p:sp>
+        <p:nvSpPr>
+          <p:cNvPr id="34" name="Rectangle 33">
+            <a:extLst>
+              <a:ext uri="{FF2B5EF4-FFF2-40B4-BE49-F238E27FC236}">
+                <a16:creationId xmlns:a16="http://schemas.microsoft.com/office/drawing/2014/main" id="{24419BFF-4F8C-4763-A4C9-E43886552E44}"/>
+              </a:ext>
+            </a:extLst>
+          </p:cNvPr>
+          <p:cNvSpPr/>
+          <p:nvPr/>
+        </p:nvSpPr>
+        <p:spPr>
+          <a:xfrm>
+            <a:off x="3487161" y="5049267"/>
+            <a:ext cx="1303598" cy="411685"/>
+          </a:xfrm>
+          <a:prstGeom prst="rect">
+            <a:avLst/>
+          </a:prstGeom>
+          <a:noFill/>
+          <a:ln>
+            <a:noFill/>
+          </a:ln>
+        </p:spPr>
+        <p:style>
+          <a:lnRef idx="2">
+            <a:schemeClr val="accent1">
+              <a:shade val="50000"/>
+            </a:schemeClr>
+          </a:lnRef>
+          <a:fillRef idx="1">
+            <a:schemeClr val="accent1"/>
+          </a:fillRef>
+          <a:effectRef idx="0">
+            <a:schemeClr val="accent1"/>
+          </a:effectRef>
+          <a:fontRef idx="minor">
+            <a:schemeClr val="lt1"/>
+          </a:fontRef>
+        </p:style>
+        <p:txBody>
+          <a:bodyPr rtlCol="0" anchor="ctr"/>
+          <a:lstStyle/>
+          <a:p>
+            <a:pPr algn="ctr"/>
+            <a:r>
+              <a:rPr lang="en-US" altLang="ko-KR" sz="1600" dirty="0">
+                <a:solidFill>
+                  <a:schemeClr val="bg1"/>
+                </a:solidFill>
+                <a:latin typeface="Noto Sans CJK KR Medium" panose="020B0600000000000000" pitchFamily="34" charset="-127"/>
+                <a:ea typeface="Noto Sans CJK KR Medium" panose="020B0600000000000000" pitchFamily="34" charset="-127"/>
+              </a:rPr>
+              <a:t>Remainder</a:t>
+            </a:r>
+            <a:endParaRPr lang="ko-KR" altLang="en-US" sz="1600" dirty="0">
+              <a:solidFill>
+                <a:schemeClr val="bg1"/>
+              </a:solidFill>
+            </a:endParaRPr>
+          </a:p>
+        </p:txBody>
+      </p:sp>
+      <p:sp>
+        <p:nvSpPr>
+          <p:cNvPr id="38" name="Rectangle 37">
+            <a:extLst>
+              <a:ext uri="{FF2B5EF4-FFF2-40B4-BE49-F238E27FC236}">
+                <a16:creationId xmlns:a16="http://schemas.microsoft.com/office/drawing/2014/main" id="{5B245133-8125-4AAB-A064-81E73F5B0505}"/>
+              </a:ext>
+            </a:extLst>
+          </p:cNvPr>
+          <p:cNvSpPr/>
+          <p:nvPr/>
+        </p:nvSpPr>
+        <p:spPr>
+          <a:xfrm>
+            <a:off x="4429957" y="5459044"/>
+            <a:ext cx="852804" cy="411685"/>
+          </a:xfrm>
+          <a:prstGeom prst="rect">
+            <a:avLst/>
+          </a:prstGeom>
+          <a:noFill/>
+          <a:ln>
+            <a:noFill/>
+          </a:ln>
+        </p:spPr>
+        <p:style>
+          <a:lnRef idx="2">
+            <a:schemeClr val="accent1">
+              <a:shade val="50000"/>
+            </a:schemeClr>
+          </a:lnRef>
+          <a:fillRef idx="1">
+            <a:schemeClr val="accent1"/>
+          </a:fillRef>
+          <a:effectRef idx="0">
+            <a:schemeClr val="accent1"/>
+          </a:effectRef>
+          <a:fontRef idx="minor">
+            <a:schemeClr val="lt1"/>
+          </a:fontRef>
+        </p:style>
+        <p:txBody>
+          <a:bodyPr rtlCol="0" anchor="ctr"/>
+          <a:lstStyle/>
+          <a:p>
+            <a:pPr algn="ctr"/>
+            <a:r>
+              <a:rPr lang="en-US" altLang="ko-KR" sz="1600" dirty="0">
+                <a:solidFill>
+                  <a:schemeClr val="bg1"/>
+                </a:solidFill>
+                <a:latin typeface="Noto Sans CJK KR Medium" panose="020B0600000000000000" pitchFamily="34" charset="-127"/>
+                <a:ea typeface="Noto Sans CJK KR Medium" panose="020B0600000000000000" pitchFamily="34" charset="-127"/>
+              </a:rPr>
+              <a:t>Write</a:t>
+            </a:r>
+            <a:endParaRPr lang="ko-KR" altLang="en-US" sz="1600" dirty="0">
+              <a:solidFill>
+                <a:schemeClr val="bg1"/>
+              </a:solidFill>
+            </a:endParaRPr>
+          </a:p>
+        </p:txBody>
+      </p:sp>
+      <p:sp>
+        <p:nvSpPr>
+          <p:cNvPr id="45" name="Rectangle 44">
+            <a:extLst>
+              <a:ext uri="{FF2B5EF4-FFF2-40B4-BE49-F238E27FC236}">
+                <a16:creationId xmlns:a16="http://schemas.microsoft.com/office/drawing/2014/main" id="{5C8BA490-F374-4981-BCA1-8AB40533E25A}"/>
+              </a:ext>
+            </a:extLst>
+          </p:cNvPr>
+          <p:cNvSpPr/>
+          <p:nvPr/>
+        </p:nvSpPr>
+        <p:spPr>
+          <a:xfrm>
+            <a:off x="4856359" y="2989121"/>
+            <a:ext cx="714897" cy="467822"/>
+          </a:xfrm>
+          <a:prstGeom prst="rect">
+            <a:avLst/>
+          </a:prstGeom>
+          <a:noFill/>
+          <a:ln>
+            <a:noFill/>
+          </a:ln>
+        </p:spPr>
+        <p:style>
+          <a:lnRef idx="2">
+            <a:schemeClr val="accent1">
+              <a:shade val="50000"/>
+            </a:schemeClr>
+          </a:lnRef>
+          <a:fillRef idx="1">
+            <a:schemeClr val="accent1"/>
+          </a:fillRef>
+          <a:effectRef idx="0">
+            <a:schemeClr val="accent1"/>
+          </a:effectRef>
+          <a:fontRef idx="minor">
+            <a:schemeClr val="lt1"/>
+          </a:fontRef>
+        </p:style>
+        <p:txBody>
+          <a:bodyPr rtlCol="0" anchor="ctr"/>
+          <a:lstStyle/>
+          <a:p>
+            <a:r>
+              <a:rPr lang="en-US" altLang="ko-KR" sz="1200" dirty="0">
+                <a:solidFill>
+                  <a:schemeClr val="tx1"/>
+                </a:solidFill>
+                <a:latin typeface="Noto Sans CJK KR Medium" panose="020B0600000000000000" pitchFamily="34" charset="-127"/>
                 <a:ea typeface="Noto Sans CJK KR Medium" panose="020B0600000000000000" pitchFamily="34" charset="-127"/>
               </a:rPr>
               <a:t>64bits</a:t>
@@ -9876,10 +10942,1305 @@
           </a:p>
         </p:txBody>
       </p:sp>
+      <p:sp>
+        <p:nvSpPr>
+          <p:cNvPr id="47" name="Rectangle 46">
+            <a:extLst>
+              <a:ext uri="{FF2B5EF4-FFF2-40B4-BE49-F238E27FC236}">
+                <a16:creationId xmlns:a16="http://schemas.microsoft.com/office/drawing/2014/main" id="{82A41A0F-F873-4CE6-887A-94E6FBAB9F2A}"/>
+              </a:ext>
+            </a:extLst>
+          </p:cNvPr>
+          <p:cNvSpPr/>
+          <p:nvPr/>
+        </p:nvSpPr>
+        <p:spPr>
+          <a:xfrm>
+            <a:off x="3783853" y="2293398"/>
+            <a:ext cx="2179976" cy="719026"/>
+          </a:xfrm>
+          <a:prstGeom prst="rect">
+            <a:avLst/>
+          </a:prstGeom>
+          <a:solidFill>
+            <a:srgbClr val="787878"/>
+          </a:solidFill>
+          <a:ln>
+            <a:noFill/>
+          </a:ln>
+        </p:spPr>
+        <p:style>
+          <a:lnRef idx="2">
+            <a:schemeClr val="accent1">
+              <a:shade val="50000"/>
+            </a:schemeClr>
+          </a:lnRef>
+          <a:fillRef idx="1">
+            <a:schemeClr val="accent1"/>
+          </a:fillRef>
+          <a:effectRef idx="0">
+            <a:schemeClr val="accent1"/>
+          </a:effectRef>
+          <a:fontRef idx="minor">
+            <a:schemeClr val="lt1"/>
+          </a:fontRef>
+        </p:style>
+        <p:txBody>
+          <a:bodyPr rtlCol="0" anchor="ctr"/>
+          <a:lstStyle/>
+          <a:p>
+            <a:pPr algn="ctr"/>
+            <a:endParaRPr lang="ko-KR" altLang="en-US" dirty="0"/>
+          </a:p>
+        </p:txBody>
+      </p:sp>
+      <p:sp>
+        <p:nvSpPr>
+          <p:cNvPr id="48" name="Rectangle 47">
+            <a:extLst>
+              <a:ext uri="{FF2B5EF4-FFF2-40B4-BE49-F238E27FC236}">
+                <a16:creationId xmlns:a16="http://schemas.microsoft.com/office/drawing/2014/main" id="{59CA5D1C-9277-4168-81EA-AA7D7B68590C}"/>
+              </a:ext>
+            </a:extLst>
+          </p:cNvPr>
+          <p:cNvSpPr/>
+          <p:nvPr/>
+        </p:nvSpPr>
+        <p:spPr>
+          <a:xfrm>
+            <a:off x="4048219" y="2281420"/>
+            <a:ext cx="1651244" cy="411685"/>
+          </a:xfrm>
+          <a:prstGeom prst="rect">
+            <a:avLst/>
+          </a:prstGeom>
+          <a:noFill/>
+          <a:ln>
+            <a:noFill/>
+          </a:ln>
+        </p:spPr>
+        <p:style>
+          <a:lnRef idx="2">
+            <a:schemeClr val="accent1">
+              <a:shade val="50000"/>
+            </a:schemeClr>
+          </a:lnRef>
+          <a:fillRef idx="1">
+            <a:schemeClr val="accent1"/>
+          </a:fillRef>
+          <a:effectRef idx="0">
+            <a:schemeClr val="accent1"/>
+          </a:effectRef>
+          <a:fontRef idx="minor">
+            <a:schemeClr val="lt1"/>
+          </a:fontRef>
+        </p:style>
+        <p:txBody>
+          <a:bodyPr rtlCol="0" anchor="ctr"/>
+          <a:lstStyle/>
+          <a:p>
+            <a:pPr algn="ctr"/>
+            <a:r>
+              <a:rPr lang="en-US" altLang="ko-KR" sz="1600" dirty="0">
+                <a:solidFill>
+                  <a:schemeClr val="bg1"/>
+                </a:solidFill>
+                <a:latin typeface="Noto Sans CJK KR Medium" panose="020B0600000000000000" pitchFamily="34" charset="-127"/>
+                <a:ea typeface="Noto Sans CJK KR Medium" panose="020B0600000000000000" pitchFamily="34" charset="-127"/>
+              </a:rPr>
+              <a:t>Divisor</a:t>
+            </a:r>
+            <a:endParaRPr lang="ko-KR" altLang="en-US" sz="1600" dirty="0">
+              <a:solidFill>
+                <a:schemeClr val="bg1"/>
+              </a:solidFill>
+            </a:endParaRPr>
+          </a:p>
+        </p:txBody>
+      </p:sp>
+      <p:sp>
+        <p:nvSpPr>
+          <p:cNvPr id="49" name="Rectangle 48">
+            <a:extLst>
+              <a:ext uri="{FF2B5EF4-FFF2-40B4-BE49-F238E27FC236}">
+                <a16:creationId xmlns:a16="http://schemas.microsoft.com/office/drawing/2014/main" id="{7B7D55C2-408E-4254-9C7E-B99699569EBB}"/>
+              </a:ext>
+            </a:extLst>
+          </p:cNvPr>
+          <p:cNvSpPr/>
+          <p:nvPr/>
+        </p:nvSpPr>
+        <p:spPr>
+          <a:xfrm>
+            <a:off x="4839151" y="2612965"/>
+            <a:ext cx="1178491" cy="411685"/>
+          </a:xfrm>
+          <a:prstGeom prst="rect">
+            <a:avLst/>
+          </a:prstGeom>
+          <a:noFill/>
+          <a:ln>
+            <a:noFill/>
+          </a:ln>
+        </p:spPr>
+        <p:style>
+          <a:lnRef idx="2">
+            <a:schemeClr val="accent1">
+              <a:shade val="50000"/>
+            </a:schemeClr>
+          </a:lnRef>
+          <a:fillRef idx="1">
+            <a:schemeClr val="accent1"/>
+          </a:fillRef>
+          <a:effectRef idx="0">
+            <a:schemeClr val="accent1"/>
+          </a:effectRef>
+          <a:fontRef idx="minor">
+            <a:schemeClr val="lt1"/>
+          </a:fontRef>
+        </p:style>
+        <p:txBody>
+          <a:bodyPr rtlCol="0" anchor="ctr"/>
+          <a:lstStyle/>
+          <a:p>
+            <a:pPr algn="ctr"/>
+            <a:r>
+              <a:rPr lang="en-US" altLang="ko-KR" sz="1600" dirty="0">
+                <a:solidFill>
+                  <a:schemeClr val="bg1"/>
+                </a:solidFill>
+                <a:latin typeface="Noto Sans CJK KR Medium" panose="020B0600000000000000" pitchFamily="34" charset="-127"/>
+                <a:ea typeface="Noto Sans CJK KR Medium" panose="020B0600000000000000" pitchFamily="34" charset="-127"/>
+              </a:rPr>
+              <a:t>Shift right</a:t>
+            </a:r>
+            <a:endParaRPr lang="ko-KR" altLang="en-US" sz="1600" dirty="0">
+              <a:solidFill>
+                <a:schemeClr val="bg1"/>
+              </a:solidFill>
+            </a:endParaRPr>
+          </a:p>
+        </p:txBody>
+      </p:sp>
+      <p:sp>
+        <p:nvSpPr>
+          <p:cNvPr id="51" name="Rectangle 50">
+            <a:extLst>
+              <a:ext uri="{FF2B5EF4-FFF2-40B4-BE49-F238E27FC236}">
+                <a16:creationId xmlns:a16="http://schemas.microsoft.com/office/drawing/2014/main" id="{6727118C-AC21-4562-B024-A45C83E2B5A1}"/>
+              </a:ext>
+            </a:extLst>
+          </p:cNvPr>
+          <p:cNvSpPr/>
+          <p:nvPr/>
+        </p:nvSpPr>
+        <p:spPr>
+          <a:xfrm>
+            <a:off x="7902083" y="3742938"/>
+            <a:ext cx="1533956" cy="719026"/>
+          </a:xfrm>
+          <a:prstGeom prst="rect">
+            <a:avLst/>
+          </a:prstGeom>
+          <a:solidFill>
+            <a:srgbClr val="787878"/>
+          </a:solidFill>
+          <a:ln>
+            <a:noFill/>
+          </a:ln>
+        </p:spPr>
+        <p:style>
+          <a:lnRef idx="2">
+            <a:schemeClr val="accent1">
+              <a:shade val="50000"/>
+            </a:schemeClr>
+          </a:lnRef>
+          <a:fillRef idx="1">
+            <a:schemeClr val="accent1"/>
+          </a:fillRef>
+          <a:effectRef idx="0">
+            <a:schemeClr val="accent1"/>
+          </a:effectRef>
+          <a:fontRef idx="minor">
+            <a:schemeClr val="lt1"/>
+          </a:fontRef>
+        </p:style>
+        <p:txBody>
+          <a:bodyPr rtlCol="0" anchor="ctr"/>
+          <a:lstStyle/>
+          <a:p>
+            <a:pPr algn="ctr"/>
+            <a:endParaRPr lang="ko-KR" altLang="en-US" dirty="0"/>
+          </a:p>
+        </p:txBody>
+      </p:sp>
+      <p:sp>
+        <p:nvSpPr>
+          <p:cNvPr id="52" name="Rectangle 51">
+            <a:extLst>
+              <a:ext uri="{FF2B5EF4-FFF2-40B4-BE49-F238E27FC236}">
+                <a16:creationId xmlns:a16="http://schemas.microsoft.com/office/drawing/2014/main" id="{36AF449E-06EA-4870-AA26-6DB96A6C2644}"/>
+              </a:ext>
+            </a:extLst>
+          </p:cNvPr>
+          <p:cNvSpPr/>
+          <p:nvPr/>
+        </p:nvSpPr>
+        <p:spPr>
+          <a:xfrm>
+            <a:off x="7843439" y="3730960"/>
+            <a:ext cx="1651244" cy="411685"/>
+          </a:xfrm>
+          <a:prstGeom prst="rect">
+            <a:avLst/>
+          </a:prstGeom>
+          <a:noFill/>
+          <a:ln>
+            <a:noFill/>
+          </a:ln>
+        </p:spPr>
+        <p:style>
+          <a:lnRef idx="2">
+            <a:schemeClr val="accent1">
+              <a:shade val="50000"/>
+            </a:schemeClr>
+          </a:lnRef>
+          <a:fillRef idx="1">
+            <a:schemeClr val="accent1"/>
+          </a:fillRef>
+          <a:effectRef idx="0">
+            <a:schemeClr val="accent1"/>
+          </a:effectRef>
+          <a:fontRef idx="minor">
+            <a:schemeClr val="lt1"/>
+          </a:fontRef>
+        </p:style>
+        <p:txBody>
+          <a:bodyPr rtlCol="0" anchor="ctr"/>
+          <a:lstStyle/>
+          <a:p>
+            <a:pPr algn="ctr"/>
+            <a:r>
+              <a:rPr lang="en-US" altLang="ko-KR" sz="1600" dirty="0">
+                <a:solidFill>
+                  <a:schemeClr val="bg1"/>
+                </a:solidFill>
+                <a:latin typeface="Noto Sans CJK KR Medium" panose="020B0600000000000000" pitchFamily="34" charset="-127"/>
+                <a:ea typeface="Noto Sans CJK KR Medium" panose="020B0600000000000000" pitchFamily="34" charset="-127"/>
+              </a:rPr>
+              <a:t>Quotient</a:t>
+            </a:r>
+            <a:endParaRPr lang="ko-KR" altLang="en-US" sz="1600" dirty="0">
+              <a:solidFill>
+                <a:schemeClr val="bg1"/>
+              </a:solidFill>
+            </a:endParaRPr>
+          </a:p>
+        </p:txBody>
+      </p:sp>
+      <p:sp>
+        <p:nvSpPr>
+          <p:cNvPr id="53" name="Rectangle 52">
+            <a:extLst>
+              <a:ext uri="{FF2B5EF4-FFF2-40B4-BE49-F238E27FC236}">
+                <a16:creationId xmlns:a16="http://schemas.microsoft.com/office/drawing/2014/main" id="{314CE618-0649-4BB4-9E17-274C3B04ACD8}"/>
+              </a:ext>
+            </a:extLst>
+          </p:cNvPr>
+          <p:cNvSpPr/>
+          <p:nvPr/>
+        </p:nvSpPr>
+        <p:spPr>
+          <a:xfrm>
+            <a:off x="8273994" y="4062505"/>
+            <a:ext cx="1246343" cy="411685"/>
+          </a:xfrm>
+          <a:prstGeom prst="rect">
+            <a:avLst/>
+          </a:prstGeom>
+          <a:noFill/>
+          <a:ln>
+            <a:noFill/>
+          </a:ln>
+        </p:spPr>
+        <p:style>
+          <a:lnRef idx="2">
+            <a:schemeClr val="accent1">
+              <a:shade val="50000"/>
+            </a:schemeClr>
+          </a:lnRef>
+          <a:fillRef idx="1">
+            <a:schemeClr val="accent1"/>
+          </a:fillRef>
+          <a:effectRef idx="0">
+            <a:schemeClr val="accent1"/>
+          </a:effectRef>
+          <a:fontRef idx="minor">
+            <a:schemeClr val="lt1"/>
+          </a:fontRef>
+        </p:style>
+        <p:txBody>
+          <a:bodyPr rtlCol="0" anchor="ctr"/>
+          <a:lstStyle/>
+          <a:p>
+            <a:pPr algn="ctr"/>
+            <a:r>
+              <a:rPr lang="en-US" altLang="ko-KR" sz="1600" dirty="0">
+                <a:solidFill>
+                  <a:schemeClr val="bg1"/>
+                </a:solidFill>
+                <a:latin typeface="Noto Sans CJK KR Medium" panose="020B0600000000000000" pitchFamily="34" charset="-127"/>
+                <a:ea typeface="Noto Sans CJK KR Medium" panose="020B0600000000000000" pitchFamily="34" charset="-127"/>
+              </a:rPr>
+              <a:t>Shift left</a:t>
+            </a:r>
+            <a:endParaRPr lang="ko-KR" altLang="en-US" sz="1600" dirty="0">
+              <a:solidFill>
+                <a:schemeClr val="bg1"/>
+              </a:solidFill>
+            </a:endParaRPr>
+          </a:p>
+        </p:txBody>
+      </p:sp>
+      <p:sp>
+        <p:nvSpPr>
+          <p:cNvPr id="20" name="Oval 19">
+            <a:extLst>
+              <a:ext uri="{FF2B5EF4-FFF2-40B4-BE49-F238E27FC236}">
+                <a16:creationId xmlns:a16="http://schemas.microsoft.com/office/drawing/2014/main" id="{669C8788-2F12-4EF6-AE5F-5D6591464252}"/>
+              </a:ext>
+            </a:extLst>
+          </p:cNvPr>
+          <p:cNvSpPr/>
+          <p:nvPr/>
+        </p:nvSpPr>
+        <p:spPr>
+          <a:xfrm>
+            <a:off x="6455307" y="5312710"/>
+            <a:ext cx="1472715" cy="710767"/>
+          </a:xfrm>
+          <a:prstGeom prst="ellipse">
+            <a:avLst/>
+          </a:prstGeom>
+          <a:solidFill>
+            <a:srgbClr val="013B51"/>
+          </a:solidFill>
+          <a:ln>
+            <a:noFill/>
+          </a:ln>
+        </p:spPr>
+        <p:style>
+          <a:lnRef idx="2">
+            <a:schemeClr val="accent1">
+              <a:shade val="50000"/>
+            </a:schemeClr>
+          </a:lnRef>
+          <a:fillRef idx="1">
+            <a:schemeClr val="accent1"/>
+          </a:fillRef>
+          <a:effectRef idx="0">
+            <a:schemeClr val="accent1"/>
+          </a:effectRef>
+          <a:fontRef idx="minor">
+            <a:schemeClr val="lt1"/>
+          </a:fontRef>
+        </p:style>
+        <p:txBody>
+          <a:bodyPr rtlCol="0" anchor="ctr"/>
+          <a:lstStyle/>
+          <a:p>
+            <a:pPr algn="ctr"/>
+            <a:endParaRPr lang="ko-KR" altLang="en-US"/>
+          </a:p>
+        </p:txBody>
+      </p:sp>
+      <p:sp>
+        <p:nvSpPr>
+          <p:cNvPr id="55" name="Rectangle 54">
+            <a:extLst>
+              <a:ext uri="{FF2B5EF4-FFF2-40B4-BE49-F238E27FC236}">
+                <a16:creationId xmlns:a16="http://schemas.microsoft.com/office/drawing/2014/main" id="{704C8CF8-8EDC-454B-ACB0-5A253F913D50}"/>
+              </a:ext>
+            </a:extLst>
+          </p:cNvPr>
+          <p:cNvSpPr/>
+          <p:nvPr/>
+        </p:nvSpPr>
+        <p:spPr>
+          <a:xfrm>
+            <a:off x="6455309" y="5196506"/>
+            <a:ext cx="1453594" cy="914372"/>
+          </a:xfrm>
+          <a:prstGeom prst="rect">
+            <a:avLst/>
+          </a:prstGeom>
+          <a:noFill/>
+          <a:ln>
+            <a:noFill/>
+          </a:ln>
+        </p:spPr>
+        <p:style>
+          <a:lnRef idx="2">
+            <a:schemeClr val="accent1">
+              <a:shade val="50000"/>
+            </a:schemeClr>
+          </a:lnRef>
+          <a:fillRef idx="1">
+            <a:schemeClr val="accent1"/>
+          </a:fillRef>
+          <a:effectRef idx="0">
+            <a:schemeClr val="accent1"/>
+          </a:effectRef>
+          <a:fontRef idx="minor">
+            <a:schemeClr val="lt1"/>
+          </a:fontRef>
+        </p:style>
+        <p:txBody>
+          <a:bodyPr rtlCol="0" anchor="ctr"/>
+          <a:lstStyle/>
+          <a:p>
+            <a:pPr algn="ctr"/>
+            <a:r>
+              <a:rPr lang="en-US" altLang="ko-KR" sz="1600" dirty="0">
+                <a:solidFill>
+                  <a:srgbClr val="EBFFFF"/>
+                </a:solidFill>
+                <a:latin typeface="Noto Sans CJK KR Medium" panose="020B0600000000000000" pitchFamily="34" charset="-127"/>
+                <a:ea typeface="Noto Sans CJK KR Medium" panose="020B0600000000000000" pitchFamily="34" charset="-127"/>
+              </a:rPr>
+              <a:t>Control test</a:t>
+            </a:r>
+            <a:endParaRPr lang="ko-KR" altLang="en-US" sz="1600" dirty="0"/>
+          </a:p>
+        </p:txBody>
+      </p:sp>
+      <p:cxnSp>
+        <p:nvCxnSpPr>
+          <p:cNvPr id="59" name="Straight Arrow Connector 58">
+            <a:extLst>
+              <a:ext uri="{FF2B5EF4-FFF2-40B4-BE49-F238E27FC236}">
+                <a16:creationId xmlns:a16="http://schemas.microsoft.com/office/drawing/2014/main" id="{8C9A67FD-201A-4CD1-B52C-E8B8BCFC5281}"/>
+              </a:ext>
+            </a:extLst>
+          </p:cNvPr>
+          <p:cNvCxnSpPr>
+            <a:cxnSpLocks/>
+          </p:cNvCxnSpPr>
+          <p:nvPr/>
+        </p:nvCxnSpPr>
+        <p:spPr>
+          <a:xfrm flipH="1">
+            <a:off x="5963829" y="2837502"/>
+            <a:ext cx="906622" cy="0"/>
+          </a:xfrm>
+          <a:prstGeom prst="straightConnector1">
+            <a:avLst/>
+          </a:prstGeom>
+          <a:ln w="38100">
+            <a:solidFill>
+              <a:srgbClr val="013B51"/>
+            </a:solidFill>
+            <a:tailEnd type="triangle"/>
+          </a:ln>
+        </p:spPr>
+        <p:style>
+          <a:lnRef idx="1">
+            <a:schemeClr val="accent1"/>
+          </a:lnRef>
+          <a:fillRef idx="0">
+            <a:schemeClr val="accent1"/>
+          </a:fillRef>
+          <a:effectRef idx="0">
+            <a:schemeClr val="accent1"/>
+          </a:effectRef>
+          <a:fontRef idx="minor">
+            <a:schemeClr val="tx1"/>
+          </a:fontRef>
+        </p:style>
+      </p:cxnSp>
+      <p:cxnSp>
+        <p:nvCxnSpPr>
+          <p:cNvPr id="60" name="Straight Arrow Connector 59">
+            <a:extLst>
+              <a:ext uri="{FF2B5EF4-FFF2-40B4-BE49-F238E27FC236}">
+                <a16:creationId xmlns:a16="http://schemas.microsoft.com/office/drawing/2014/main" id="{8B0C6680-46E0-4C8E-BFF4-461C1BB4F8BC}"/>
+              </a:ext>
+            </a:extLst>
+          </p:cNvPr>
+          <p:cNvCxnSpPr>
+            <a:cxnSpLocks/>
+            <a:stCxn id="20" idx="2"/>
+          </p:cNvCxnSpPr>
+          <p:nvPr/>
+        </p:nvCxnSpPr>
+        <p:spPr>
+          <a:xfrm flipH="1" flipV="1">
+            <a:off x="5228949" y="5651724"/>
+            <a:ext cx="1226358" cy="16370"/>
+          </a:xfrm>
+          <a:prstGeom prst="straightConnector1">
+            <a:avLst/>
+          </a:prstGeom>
+          <a:ln w="38100">
+            <a:solidFill>
+              <a:srgbClr val="013B51"/>
+            </a:solidFill>
+            <a:tailEnd type="triangle"/>
+          </a:ln>
+        </p:spPr>
+        <p:style>
+          <a:lnRef idx="1">
+            <a:schemeClr val="accent1"/>
+          </a:lnRef>
+          <a:fillRef idx="0">
+            <a:schemeClr val="accent1"/>
+          </a:fillRef>
+          <a:effectRef idx="0">
+            <a:schemeClr val="accent1"/>
+          </a:effectRef>
+          <a:fontRef idx="minor">
+            <a:schemeClr val="tx1"/>
+          </a:fontRef>
+        </p:style>
+      </p:cxnSp>
+      <p:cxnSp>
+        <p:nvCxnSpPr>
+          <p:cNvPr id="63" name="Straight Arrow Connector 62">
+            <a:extLst>
+              <a:ext uri="{FF2B5EF4-FFF2-40B4-BE49-F238E27FC236}">
+                <a16:creationId xmlns:a16="http://schemas.microsoft.com/office/drawing/2014/main" id="{738D4E1B-65AD-41D4-B3B3-1DCB096BBB59}"/>
+              </a:ext>
+            </a:extLst>
+          </p:cNvPr>
+          <p:cNvCxnSpPr>
+            <a:cxnSpLocks/>
+          </p:cNvCxnSpPr>
+          <p:nvPr/>
+        </p:nvCxnSpPr>
+        <p:spPr>
+          <a:xfrm>
+            <a:off x="4499020" y="2171676"/>
+            <a:ext cx="837559" cy="0"/>
+          </a:xfrm>
+          <a:prstGeom prst="straightConnector1">
+            <a:avLst/>
+          </a:prstGeom>
+          <a:ln w="38100">
+            <a:solidFill>
+              <a:srgbClr val="013B51"/>
+            </a:solidFill>
+            <a:tailEnd type="triangle"/>
+          </a:ln>
+        </p:spPr>
+        <p:style>
+          <a:lnRef idx="1">
+            <a:schemeClr val="accent1"/>
+          </a:lnRef>
+          <a:fillRef idx="0">
+            <a:schemeClr val="accent1"/>
+          </a:fillRef>
+          <a:effectRef idx="0">
+            <a:schemeClr val="accent1"/>
+          </a:effectRef>
+          <a:fontRef idx="minor">
+            <a:schemeClr val="tx1"/>
+          </a:fontRef>
+        </p:style>
+      </p:cxnSp>
+      <p:cxnSp>
+        <p:nvCxnSpPr>
+          <p:cNvPr id="67" name="Straight Arrow Connector 66">
+            <a:extLst>
+              <a:ext uri="{FF2B5EF4-FFF2-40B4-BE49-F238E27FC236}">
+                <a16:creationId xmlns:a16="http://schemas.microsoft.com/office/drawing/2014/main" id="{A5FBF11D-AD54-4681-B870-518C9D16F0BE}"/>
+              </a:ext>
+            </a:extLst>
+          </p:cNvPr>
+          <p:cNvCxnSpPr>
+            <a:cxnSpLocks/>
+          </p:cNvCxnSpPr>
+          <p:nvPr/>
+        </p:nvCxnSpPr>
+        <p:spPr>
+          <a:xfrm flipH="1">
+            <a:off x="8185528" y="3662668"/>
+            <a:ext cx="906622" cy="0"/>
+          </a:xfrm>
+          <a:prstGeom prst="straightConnector1">
+            <a:avLst/>
+          </a:prstGeom>
+          <a:ln w="38100">
+            <a:solidFill>
+              <a:srgbClr val="013B51"/>
+            </a:solidFill>
+            <a:tailEnd type="triangle"/>
+          </a:ln>
+        </p:spPr>
+        <p:style>
+          <a:lnRef idx="1">
+            <a:schemeClr val="accent1"/>
+          </a:lnRef>
+          <a:fillRef idx="0">
+            <a:schemeClr val="accent1"/>
+          </a:fillRef>
+          <a:effectRef idx="0">
+            <a:schemeClr val="accent1"/>
+          </a:effectRef>
+          <a:fontRef idx="minor">
+            <a:schemeClr val="tx1"/>
+          </a:fontRef>
+        </p:style>
+      </p:cxnSp>
+      <p:cxnSp>
+        <p:nvCxnSpPr>
+          <p:cNvPr id="44" name="Straight Connector 43">
+            <a:extLst>
+              <a:ext uri="{FF2B5EF4-FFF2-40B4-BE49-F238E27FC236}">
+                <a16:creationId xmlns:a16="http://schemas.microsoft.com/office/drawing/2014/main" id="{6CD8A79B-CBFD-49C1-917A-675A1FEEB96D}"/>
+              </a:ext>
+            </a:extLst>
+          </p:cNvPr>
+          <p:cNvCxnSpPr>
+            <a:stCxn id="37" idx="2"/>
+          </p:cNvCxnSpPr>
+          <p:nvPr/>
+        </p:nvCxnSpPr>
+        <p:spPr>
+          <a:xfrm>
+            <a:off x="4138960" y="5858503"/>
+            <a:ext cx="0" cy="418010"/>
+          </a:xfrm>
+          <a:prstGeom prst="line">
+            <a:avLst/>
+          </a:prstGeom>
+          <a:ln w="38100">
+            <a:solidFill>
+              <a:srgbClr val="013B51"/>
+            </a:solidFill>
+          </a:ln>
+        </p:spPr>
+        <p:style>
+          <a:lnRef idx="1">
+            <a:schemeClr val="accent1"/>
+          </a:lnRef>
+          <a:fillRef idx="0">
+            <a:schemeClr val="accent1"/>
+          </a:fillRef>
+          <a:effectRef idx="0">
+            <a:schemeClr val="accent1"/>
+          </a:effectRef>
+          <a:fontRef idx="minor">
+            <a:schemeClr val="tx1"/>
+          </a:fontRef>
+        </p:style>
+      </p:cxnSp>
+      <p:cxnSp>
+        <p:nvCxnSpPr>
+          <p:cNvPr id="50" name="Straight Connector 49">
+            <a:extLst>
+              <a:ext uri="{FF2B5EF4-FFF2-40B4-BE49-F238E27FC236}">
+                <a16:creationId xmlns:a16="http://schemas.microsoft.com/office/drawing/2014/main" id="{ECFFFF69-82B5-48A1-A843-CEF8BFAC8555}"/>
+              </a:ext>
+            </a:extLst>
+          </p:cNvPr>
+          <p:cNvCxnSpPr>
+            <a:cxnSpLocks/>
+          </p:cNvCxnSpPr>
+          <p:nvPr/>
+        </p:nvCxnSpPr>
+        <p:spPr>
+          <a:xfrm flipH="1">
+            <a:off x="2644140" y="3051699"/>
+            <a:ext cx="828325" cy="0"/>
+          </a:xfrm>
+          <a:prstGeom prst="line">
+            <a:avLst/>
+          </a:prstGeom>
+          <a:ln w="38100">
+            <a:solidFill>
+              <a:srgbClr val="013B51"/>
+            </a:solidFill>
+          </a:ln>
+        </p:spPr>
+        <p:style>
+          <a:lnRef idx="1">
+            <a:schemeClr val="accent1"/>
+          </a:lnRef>
+          <a:fillRef idx="0">
+            <a:schemeClr val="accent1"/>
+          </a:fillRef>
+          <a:effectRef idx="0">
+            <a:schemeClr val="accent1"/>
+          </a:effectRef>
+          <a:fontRef idx="minor">
+            <a:schemeClr val="tx1"/>
+          </a:fontRef>
+        </p:style>
+      </p:cxnSp>
+      <p:cxnSp>
+        <p:nvCxnSpPr>
+          <p:cNvPr id="56" name="Straight Connector 55">
+            <a:extLst>
+              <a:ext uri="{FF2B5EF4-FFF2-40B4-BE49-F238E27FC236}">
+                <a16:creationId xmlns:a16="http://schemas.microsoft.com/office/drawing/2014/main" id="{88612BF7-7739-4092-A186-9576450C24C1}"/>
+              </a:ext>
+            </a:extLst>
+          </p:cNvPr>
+          <p:cNvCxnSpPr>
+            <a:cxnSpLocks/>
+          </p:cNvCxnSpPr>
+          <p:nvPr/>
+        </p:nvCxnSpPr>
+        <p:spPr>
+          <a:xfrm>
+            <a:off x="2663301" y="3051699"/>
+            <a:ext cx="0" cy="3253851"/>
+          </a:xfrm>
+          <a:prstGeom prst="line">
+            <a:avLst/>
+          </a:prstGeom>
+          <a:ln w="38100">
+            <a:solidFill>
+              <a:srgbClr val="013B51"/>
+            </a:solidFill>
+          </a:ln>
+        </p:spPr>
+        <p:style>
+          <a:lnRef idx="1">
+            <a:schemeClr val="accent1"/>
+          </a:lnRef>
+          <a:fillRef idx="0">
+            <a:schemeClr val="accent1"/>
+          </a:fillRef>
+          <a:effectRef idx="0">
+            <a:schemeClr val="accent1"/>
+          </a:effectRef>
+          <a:fontRef idx="minor">
+            <a:schemeClr val="tx1"/>
+          </a:fontRef>
+        </p:style>
+      </p:cxnSp>
+      <p:cxnSp>
+        <p:nvCxnSpPr>
+          <p:cNvPr id="58" name="Straight Connector 57">
+            <a:extLst>
+              <a:ext uri="{FF2B5EF4-FFF2-40B4-BE49-F238E27FC236}">
+                <a16:creationId xmlns:a16="http://schemas.microsoft.com/office/drawing/2014/main" id="{10A9287E-B344-4557-A245-CBEC21302B5A}"/>
+              </a:ext>
+            </a:extLst>
+          </p:cNvPr>
+          <p:cNvCxnSpPr>
+            <a:cxnSpLocks/>
+          </p:cNvCxnSpPr>
+          <p:nvPr/>
+        </p:nvCxnSpPr>
+        <p:spPr>
+          <a:xfrm>
+            <a:off x="2670810" y="6287943"/>
+            <a:ext cx="1484886" cy="0"/>
+          </a:xfrm>
+          <a:prstGeom prst="line">
+            <a:avLst/>
+          </a:prstGeom>
+          <a:ln w="38100">
+            <a:solidFill>
+              <a:srgbClr val="013B51"/>
+            </a:solidFill>
+          </a:ln>
+        </p:spPr>
+        <p:style>
+          <a:lnRef idx="1">
+            <a:schemeClr val="accent1"/>
+          </a:lnRef>
+          <a:fillRef idx="0">
+            <a:schemeClr val="accent1"/>
+          </a:fillRef>
+          <a:effectRef idx="0">
+            <a:schemeClr val="accent1"/>
+          </a:effectRef>
+          <a:fontRef idx="minor">
+            <a:schemeClr val="tx1"/>
+          </a:fontRef>
+        </p:style>
+      </p:cxnSp>
+      <p:cxnSp>
+        <p:nvCxnSpPr>
+          <p:cNvPr id="82" name="Straight Connector 81">
+            <a:extLst>
+              <a:ext uri="{FF2B5EF4-FFF2-40B4-BE49-F238E27FC236}">
+                <a16:creationId xmlns:a16="http://schemas.microsoft.com/office/drawing/2014/main" id="{779B4010-CA7E-48DE-9275-F8791F7A4533}"/>
+              </a:ext>
+            </a:extLst>
+          </p:cNvPr>
+          <p:cNvCxnSpPr>
+            <a:cxnSpLocks/>
+          </p:cNvCxnSpPr>
+          <p:nvPr/>
+        </p:nvCxnSpPr>
+        <p:spPr>
+          <a:xfrm>
+            <a:off x="6869800" y="2818737"/>
+            <a:ext cx="0" cy="2569111"/>
+          </a:xfrm>
+          <a:prstGeom prst="line">
+            <a:avLst/>
+          </a:prstGeom>
+          <a:ln w="38100">
+            <a:solidFill>
+              <a:srgbClr val="013B51"/>
+            </a:solidFill>
+          </a:ln>
+        </p:spPr>
+        <p:style>
+          <a:lnRef idx="1">
+            <a:schemeClr val="accent1"/>
+          </a:lnRef>
+          <a:fillRef idx="0">
+            <a:schemeClr val="accent1"/>
+          </a:fillRef>
+          <a:effectRef idx="0">
+            <a:schemeClr val="accent1"/>
+          </a:effectRef>
+          <a:fontRef idx="minor">
+            <a:schemeClr val="tx1"/>
+          </a:fontRef>
+        </p:style>
+      </p:cxnSp>
+      <p:cxnSp>
+        <p:nvCxnSpPr>
+          <p:cNvPr id="90" name="Straight Connector 89">
+            <a:extLst>
+              <a:ext uri="{FF2B5EF4-FFF2-40B4-BE49-F238E27FC236}">
+                <a16:creationId xmlns:a16="http://schemas.microsoft.com/office/drawing/2014/main" id="{CEF141C5-98D7-4CE5-BEF9-980A34F38546}"/>
+              </a:ext>
+            </a:extLst>
+          </p:cNvPr>
+          <p:cNvCxnSpPr>
+            <a:cxnSpLocks/>
+          </p:cNvCxnSpPr>
+          <p:nvPr/>
+        </p:nvCxnSpPr>
+        <p:spPr>
+          <a:xfrm>
+            <a:off x="6587231" y="3998716"/>
+            <a:ext cx="0" cy="1536452"/>
+          </a:xfrm>
+          <a:prstGeom prst="line">
+            <a:avLst/>
+          </a:prstGeom>
+          <a:ln w="38100">
+            <a:solidFill>
+              <a:srgbClr val="013B51"/>
+            </a:solidFill>
+          </a:ln>
+        </p:spPr>
+        <p:style>
+          <a:lnRef idx="1">
+            <a:schemeClr val="accent1"/>
+          </a:lnRef>
+          <a:fillRef idx="0">
+            <a:schemeClr val="accent1"/>
+          </a:fillRef>
+          <a:effectRef idx="0">
+            <a:schemeClr val="accent1"/>
+          </a:effectRef>
+          <a:fontRef idx="minor">
+            <a:schemeClr val="tx1"/>
+          </a:fontRef>
+        </p:style>
+      </p:cxnSp>
+      <p:cxnSp>
+        <p:nvCxnSpPr>
+          <p:cNvPr id="91" name="Straight Connector 90">
+            <a:extLst>
+              <a:ext uri="{FF2B5EF4-FFF2-40B4-BE49-F238E27FC236}">
+                <a16:creationId xmlns:a16="http://schemas.microsoft.com/office/drawing/2014/main" id="{1A49C88D-7377-438F-B789-4C8A2E35C5C0}"/>
+              </a:ext>
+            </a:extLst>
+          </p:cNvPr>
+          <p:cNvCxnSpPr>
+            <a:cxnSpLocks/>
+          </p:cNvCxnSpPr>
+          <p:nvPr/>
+        </p:nvCxnSpPr>
+        <p:spPr>
+          <a:xfrm>
+            <a:off x="7832496" y="5800263"/>
+            <a:ext cx="1985874" cy="0"/>
+          </a:xfrm>
+          <a:prstGeom prst="line">
+            <a:avLst/>
+          </a:prstGeom>
+          <a:ln w="38100">
+            <a:solidFill>
+              <a:srgbClr val="013B51"/>
+            </a:solidFill>
+          </a:ln>
+        </p:spPr>
+        <p:style>
+          <a:lnRef idx="1">
+            <a:schemeClr val="accent1"/>
+          </a:lnRef>
+          <a:fillRef idx="0">
+            <a:schemeClr val="accent1"/>
+          </a:fillRef>
+          <a:effectRef idx="0">
+            <a:schemeClr val="accent1"/>
+          </a:effectRef>
+          <a:fontRef idx="minor">
+            <a:schemeClr val="tx1"/>
+          </a:fontRef>
+        </p:style>
+      </p:cxnSp>
+      <p:cxnSp>
+        <p:nvCxnSpPr>
+          <p:cNvPr id="92" name="Straight Arrow Connector 91">
+            <a:extLst>
+              <a:ext uri="{FF2B5EF4-FFF2-40B4-BE49-F238E27FC236}">
+                <a16:creationId xmlns:a16="http://schemas.microsoft.com/office/drawing/2014/main" id="{7956FC96-3ADA-4AEA-8DDD-319F57E2AA52}"/>
+              </a:ext>
+            </a:extLst>
+          </p:cNvPr>
+          <p:cNvCxnSpPr>
+            <a:cxnSpLocks/>
+          </p:cNvCxnSpPr>
+          <p:nvPr/>
+        </p:nvCxnSpPr>
+        <p:spPr>
+          <a:xfrm flipH="1">
+            <a:off x="9436039" y="4345152"/>
+            <a:ext cx="363281" cy="0"/>
+          </a:xfrm>
+          <a:prstGeom prst="straightConnector1">
+            <a:avLst/>
+          </a:prstGeom>
+          <a:ln w="38100">
+            <a:solidFill>
+              <a:srgbClr val="013B51"/>
+            </a:solidFill>
+            <a:tailEnd type="triangle"/>
+          </a:ln>
+        </p:spPr>
+        <p:style>
+          <a:lnRef idx="1">
+            <a:schemeClr val="accent1"/>
+          </a:lnRef>
+          <a:fillRef idx="0">
+            <a:schemeClr val="accent1"/>
+          </a:fillRef>
+          <a:effectRef idx="0">
+            <a:schemeClr val="accent1"/>
+          </a:effectRef>
+          <a:fontRef idx="minor">
+            <a:schemeClr val="tx1"/>
+          </a:fontRef>
+        </p:style>
+      </p:cxnSp>
+      <p:cxnSp>
+        <p:nvCxnSpPr>
+          <p:cNvPr id="93" name="Straight Connector 92">
+            <a:extLst>
+              <a:ext uri="{FF2B5EF4-FFF2-40B4-BE49-F238E27FC236}">
+                <a16:creationId xmlns:a16="http://schemas.microsoft.com/office/drawing/2014/main" id="{04CD387A-605D-4481-B1EA-320989C7C95E}"/>
+              </a:ext>
+            </a:extLst>
+          </p:cNvPr>
+          <p:cNvCxnSpPr>
+            <a:cxnSpLocks/>
+          </p:cNvCxnSpPr>
+          <p:nvPr/>
+        </p:nvCxnSpPr>
+        <p:spPr>
+          <a:xfrm>
+            <a:off x="9799320" y="4325861"/>
+            <a:ext cx="0" cy="1474402"/>
+          </a:xfrm>
+          <a:prstGeom prst="line">
+            <a:avLst/>
+          </a:prstGeom>
+          <a:ln w="38100">
+            <a:solidFill>
+              <a:srgbClr val="013B51"/>
+            </a:solidFill>
+          </a:ln>
+        </p:spPr>
+        <p:style>
+          <a:lnRef idx="1">
+            <a:schemeClr val="accent1"/>
+          </a:lnRef>
+          <a:fillRef idx="0">
+            <a:schemeClr val="accent1"/>
+          </a:fillRef>
+          <a:effectRef idx="0">
+            <a:schemeClr val="accent1"/>
+          </a:effectRef>
+          <a:fontRef idx="minor">
+            <a:schemeClr val="tx1"/>
+          </a:fontRef>
+        </p:style>
+      </p:cxnSp>
+      <p:cxnSp>
+        <p:nvCxnSpPr>
+          <p:cNvPr id="94" name="Straight Connector 93">
+            <a:extLst>
+              <a:ext uri="{FF2B5EF4-FFF2-40B4-BE49-F238E27FC236}">
+                <a16:creationId xmlns:a16="http://schemas.microsoft.com/office/drawing/2014/main" id="{451C16A7-3F37-44A7-9B4F-4B2DF8E7D7FC}"/>
+              </a:ext>
+            </a:extLst>
+          </p:cNvPr>
+          <p:cNvCxnSpPr>
+            <a:cxnSpLocks/>
+          </p:cNvCxnSpPr>
+          <p:nvPr/>
+        </p:nvCxnSpPr>
+        <p:spPr>
+          <a:xfrm>
+            <a:off x="8750061" y="4461964"/>
+            <a:ext cx="0" cy="1021822"/>
+          </a:xfrm>
+          <a:prstGeom prst="line">
+            <a:avLst/>
+          </a:prstGeom>
+          <a:ln w="38100">
+            <a:solidFill>
+              <a:srgbClr val="013B51"/>
+            </a:solidFill>
+          </a:ln>
+        </p:spPr>
+        <p:style>
+          <a:lnRef idx="1">
+            <a:schemeClr val="accent1"/>
+          </a:lnRef>
+          <a:fillRef idx="0">
+            <a:schemeClr val="accent1"/>
+          </a:fillRef>
+          <a:effectRef idx="0">
+            <a:schemeClr val="accent1"/>
+          </a:effectRef>
+          <a:fontRef idx="minor">
+            <a:schemeClr val="tx1"/>
+          </a:fontRef>
+        </p:style>
+      </p:cxnSp>
+      <p:sp>
+        <p:nvSpPr>
+          <p:cNvPr id="96" name="Rectangle 95">
+            <a:extLst>
+              <a:ext uri="{FF2B5EF4-FFF2-40B4-BE49-F238E27FC236}">
+                <a16:creationId xmlns:a16="http://schemas.microsoft.com/office/drawing/2014/main" id="{6D1FC4F3-9EC7-45DC-A477-78BC897BEE84}"/>
+              </a:ext>
+            </a:extLst>
+          </p:cNvPr>
+          <p:cNvSpPr/>
+          <p:nvPr/>
+        </p:nvSpPr>
+        <p:spPr>
+          <a:xfrm>
+            <a:off x="8143978" y="4432356"/>
+            <a:ext cx="629103" cy="411679"/>
+          </a:xfrm>
+          <a:prstGeom prst="rect">
+            <a:avLst/>
+          </a:prstGeom>
+          <a:noFill/>
+          <a:ln>
+            <a:noFill/>
+          </a:ln>
+        </p:spPr>
+        <p:style>
+          <a:lnRef idx="2">
+            <a:schemeClr val="accent1">
+              <a:shade val="50000"/>
+            </a:schemeClr>
+          </a:lnRef>
+          <a:fillRef idx="1">
+            <a:schemeClr val="accent1"/>
+          </a:fillRef>
+          <a:effectRef idx="0">
+            <a:schemeClr val="accent1"/>
+          </a:effectRef>
+          <a:fontRef idx="minor">
+            <a:schemeClr val="lt1"/>
+          </a:fontRef>
+        </p:style>
+        <p:txBody>
+          <a:bodyPr rtlCol="0" anchor="ctr"/>
+          <a:lstStyle/>
+          <a:p>
+            <a:pPr algn="r"/>
+            <a:r>
+              <a:rPr lang="en-US" altLang="ko-KR" sz="1200" dirty="0">
+                <a:solidFill>
+                  <a:schemeClr val="tx1"/>
+                </a:solidFill>
+                <a:latin typeface="Noto Sans CJK KR Medium" panose="020B0600000000000000" pitchFamily="34" charset="-127"/>
+                <a:ea typeface="Noto Sans CJK KR Medium" panose="020B0600000000000000" pitchFamily="34" charset="-127"/>
+              </a:rPr>
+              <a:t>32bits</a:t>
+            </a:r>
+            <a:endParaRPr lang="ko-KR" altLang="en-US" sz="1200" dirty="0">
+              <a:solidFill>
+                <a:schemeClr val="tx1"/>
+              </a:solidFill>
+            </a:endParaRPr>
+          </a:p>
+        </p:txBody>
+      </p:sp>
+      <p:sp>
+        <p:nvSpPr>
+          <p:cNvPr id="97" name="Rectangle 96">
+            <a:extLst>
+              <a:ext uri="{FF2B5EF4-FFF2-40B4-BE49-F238E27FC236}">
+                <a16:creationId xmlns:a16="http://schemas.microsoft.com/office/drawing/2014/main" id="{CBB5856B-FB0A-49EE-B329-6F74B2B339A1}"/>
+              </a:ext>
+            </a:extLst>
+          </p:cNvPr>
+          <p:cNvSpPr/>
+          <p:nvPr/>
+        </p:nvSpPr>
+        <p:spPr>
+          <a:xfrm>
+            <a:off x="4124254" y="5788232"/>
+            <a:ext cx="714897" cy="467822"/>
+          </a:xfrm>
+          <a:prstGeom prst="rect">
+            <a:avLst/>
+          </a:prstGeom>
+          <a:noFill/>
+          <a:ln>
+            <a:noFill/>
+          </a:ln>
+        </p:spPr>
+        <p:style>
+          <a:lnRef idx="2">
+            <a:schemeClr val="accent1">
+              <a:shade val="50000"/>
+            </a:schemeClr>
+          </a:lnRef>
+          <a:fillRef idx="1">
+            <a:schemeClr val="accent1"/>
+          </a:fillRef>
+          <a:effectRef idx="0">
+            <a:schemeClr val="accent1"/>
+          </a:effectRef>
+          <a:fontRef idx="minor">
+            <a:schemeClr val="lt1"/>
+          </a:fontRef>
+        </p:style>
+        <p:txBody>
+          <a:bodyPr rtlCol="0" anchor="ctr"/>
+          <a:lstStyle/>
+          <a:p>
+            <a:r>
+              <a:rPr lang="en-US" altLang="ko-KR" sz="1200" dirty="0">
+                <a:solidFill>
+                  <a:schemeClr val="tx1"/>
+                </a:solidFill>
+                <a:latin typeface="Noto Sans CJK KR Medium" panose="020B0600000000000000" pitchFamily="34" charset="-127"/>
+                <a:ea typeface="Noto Sans CJK KR Medium" panose="020B0600000000000000"/>
+              </a:rPr>
+              <a:t>64bits</a:t>
+            </a:r>
+            <a:endParaRPr lang="ko-KR" altLang="en-US" sz="1200" dirty="0">
+              <a:solidFill>
+                <a:schemeClr val="tx1"/>
+              </a:solidFill>
+              <a:ea typeface="Noto Sans CJK KR Medium" panose="020B0600000000000000"/>
+            </a:endParaRPr>
+          </a:p>
+        </p:txBody>
+      </p:sp>
+      <p:cxnSp>
+        <p:nvCxnSpPr>
+          <p:cNvPr id="46" name="Straight Connector 90">
+            <a:extLst>
+              <a:ext uri="{FF2B5EF4-FFF2-40B4-BE49-F238E27FC236}">
+                <a16:creationId xmlns:a16="http://schemas.microsoft.com/office/drawing/2014/main" id="{564DEC7D-4A25-47C2-B67C-4B6E188470A4}"/>
+              </a:ext>
+            </a:extLst>
+          </p:cNvPr>
+          <p:cNvCxnSpPr>
+            <a:cxnSpLocks/>
+          </p:cNvCxnSpPr>
+          <p:nvPr/>
+        </p:nvCxnSpPr>
+        <p:spPr>
+          <a:xfrm>
+            <a:off x="4124254" y="6285766"/>
+            <a:ext cx="3114746" cy="0"/>
+          </a:xfrm>
+          <a:prstGeom prst="line">
+            <a:avLst/>
+          </a:prstGeom>
+          <a:ln w="38100">
+            <a:solidFill>
+              <a:srgbClr val="013B51"/>
+            </a:solidFill>
+          </a:ln>
+        </p:spPr>
+        <p:style>
+          <a:lnRef idx="1">
+            <a:schemeClr val="accent1"/>
+          </a:lnRef>
+          <a:fillRef idx="0">
+            <a:schemeClr val="accent1"/>
+          </a:fillRef>
+          <a:effectRef idx="0">
+            <a:schemeClr val="accent1"/>
+          </a:effectRef>
+          <a:fontRef idx="minor">
+            <a:schemeClr val="tx1"/>
+          </a:fontRef>
+        </p:style>
+      </p:cxnSp>
+      <p:cxnSp>
+        <p:nvCxnSpPr>
+          <p:cNvPr id="57" name="Straight Arrow Connector 91">
+            <a:extLst>
+              <a:ext uri="{FF2B5EF4-FFF2-40B4-BE49-F238E27FC236}">
+                <a16:creationId xmlns:a16="http://schemas.microsoft.com/office/drawing/2014/main" id="{0F82F392-87BC-4383-9A7D-0D5A8BDDE58B}"/>
+              </a:ext>
+            </a:extLst>
+          </p:cNvPr>
+          <p:cNvCxnSpPr>
+            <a:cxnSpLocks/>
+          </p:cNvCxnSpPr>
+          <p:nvPr/>
+        </p:nvCxnSpPr>
+        <p:spPr>
+          <a:xfrm flipV="1">
+            <a:off x="7239000" y="6018333"/>
+            <a:ext cx="1" cy="283407"/>
+          </a:xfrm>
+          <a:prstGeom prst="straightConnector1">
+            <a:avLst/>
+          </a:prstGeom>
+          <a:ln w="38100">
+            <a:solidFill>
+              <a:srgbClr val="013B51"/>
+            </a:solidFill>
+            <a:tailEnd type="triangle"/>
+          </a:ln>
+        </p:spPr>
+        <p:style>
+          <a:lnRef idx="1">
+            <a:schemeClr val="accent1"/>
+          </a:lnRef>
+          <a:fillRef idx="0">
+            <a:schemeClr val="accent1"/>
+          </a:fillRef>
+          <a:effectRef idx="0">
+            <a:schemeClr val="accent1"/>
+          </a:effectRef>
+          <a:fontRef idx="minor">
+            <a:schemeClr val="tx1"/>
+          </a:fontRef>
+        </p:style>
+      </p:cxnSp>
     </p:spTree>
     <p:extLst>
       <p:ext uri="{BB962C8B-B14F-4D97-AF65-F5344CB8AC3E}">
-        <p14:creationId xmlns:p14="http://schemas.microsoft.com/office/powerpoint/2010/main" val="1681449303"/>
+        <p14:creationId xmlns:p14="http://schemas.microsoft.com/office/powerpoint/2010/main" val="2946101329"/>
       </p:ext>
     </p:extLst>
   </p:cSld>

</xml_diff>